<commit_message>
Updated stuff for day3 and day4
</commit_message>
<xml_diff>
--- a/slides/day3Rekursive sorting algorithms.pptx
+++ b/slides/day3Rekursive sorting algorithms.pptx
@@ -5732,484 +5732,32 @@
           </a:p>
         </p:txBody>
       </p:sp>
-      <p:sp>
-        <p:nvSpPr>
-          <p:cNvPr id="3" name="Content Placeholder 2"/>
-          <p:cNvSpPr>
-            <a:spLocks noGrp="1"/>
-          </p:cNvSpPr>
+      <p:pic>
+        <p:nvPicPr>
+          <p:cNvPr id="7" name="Content Placeholder 6"/>
+          <p:cNvPicPr>
+            <a:picLocks noGrp="1" noChangeAspect="1"/>
+          </p:cNvPicPr>
           <p:nvPr>
             <p:ph idx="1"/>
           </p:nvPr>
-        </p:nvSpPr>
+        </p:nvPicPr>
+        <p:blipFill>
+          <a:blip r:embed="rId2"/>
+          <a:stretch>
+            <a:fillRect/>
+          </a:stretch>
+        </p:blipFill>
         <p:spPr>
           <a:xfrm>
-            <a:off x="467544" y="980728"/>
-            <a:ext cx="8229600" cy="5102027"/>
+            <a:off x="215899" y="983804"/>
+            <a:ext cx="8465799" cy="4317404"/>
           </a:xfrm>
+          <a:prstGeom prst="rect">
+            <a:avLst/>
+          </a:prstGeom>
         </p:spPr>
-        <p:txBody>
-          <a:bodyPr>
-            <a:noAutofit/>
-          </a:bodyPr>
-          <a:lstStyle/>
-          <a:p>
-            <a:pPr marL="0" indent="0">
-              <a:buNone/>
-            </a:pPr>
-            <a:r>
-              <a:rPr lang="en-US" sz="1400" dirty="0">
-                <a:latin typeface="Courier New" pitchFamily="49" charset="0"/>
-                <a:cs typeface="Courier New" pitchFamily="49" charset="0"/>
-              </a:rPr>
-              <a:t>function </a:t>
-            </a:r>
-            <a:r>
-              <a:rPr lang="en-US" sz="1400" b="1" dirty="0" err="1" smtClean="0">
-                <a:latin typeface="Courier New" pitchFamily="49" charset="0"/>
-                <a:cs typeface="Courier New" pitchFamily="49" charset="0"/>
-              </a:rPr>
-              <a:t>merge_sort</a:t>
-            </a:r>
-            <a:r>
-              <a:rPr lang="en-US" sz="1400" dirty="0" smtClean="0">
-                <a:latin typeface="Courier New" pitchFamily="49" charset="0"/>
-                <a:cs typeface="Courier New" pitchFamily="49" charset="0"/>
-              </a:rPr>
-              <a:t> (</a:t>
-            </a:r>
-            <a:r>
-              <a:rPr lang="en-US" sz="1400" dirty="0">
-                <a:latin typeface="Courier New" pitchFamily="49" charset="0"/>
-                <a:cs typeface="Courier New" pitchFamily="49" charset="0"/>
-              </a:rPr>
-              <a:t>list m)</a:t>
-            </a:r>
-          </a:p>
-          <a:p>
-            <a:pPr marL="0" indent="0">
-              <a:buNone/>
-            </a:pPr>
-            <a:r>
-              <a:rPr lang="en-US" sz="1400" dirty="0">
-                <a:latin typeface="Courier New" pitchFamily="49" charset="0"/>
-                <a:cs typeface="Courier New" pitchFamily="49" charset="0"/>
-              </a:rPr>
-              <a:t>    // if list size is 1, consider it sorted and return it</a:t>
-            </a:r>
-          </a:p>
-          <a:p>
-            <a:pPr marL="0" indent="0">
-              <a:buNone/>
-            </a:pPr>
-            <a:r>
-              <a:rPr lang="en-US" sz="1400" dirty="0">
-                <a:latin typeface="Courier New" pitchFamily="49" charset="0"/>
-                <a:cs typeface="Courier New" pitchFamily="49" charset="0"/>
-              </a:rPr>
-              <a:t>    if length(m) &lt;= 1</a:t>
-            </a:r>
-          </a:p>
-          <a:p>
-            <a:pPr marL="0" indent="0">
-              <a:buNone/>
-            </a:pPr>
-            <a:r>
-              <a:rPr lang="en-US" sz="1400" dirty="0">
-                <a:latin typeface="Courier New" pitchFamily="49" charset="0"/>
-                <a:cs typeface="Courier New" pitchFamily="49" charset="0"/>
-              </a:rPr>
-              <a:t>        return </a:t>
-            </a:r>
-            <a:r>
-              <a:rPr lang="en-US" sz="1400" dirty="0" smtClean="0">
-                <a:latin typeface="Courier New" pitchFamily="49" charset="0"/>
-                <a:cs typeface="Courier New" pitchFamily="49" charset="0"/>
-              </a:rPr>
-              <a:t>m</a:t>
-            </a:r>
-          </a:p>
-          <a:p>
-            <a:pPr marL="0" indent="0">
-              <a:buNone/>
-            </a:pPr>
-            <a:endParaRPr lang="en-US" sz="1400" dirty="0">
-              <a:latin typeface="Courier New" pitchFamily="49" charset="0"/>
-              <a:cs typeface="Courier New" pitchFamily="49" charset="0"/>
-            </a:endParaRPr>
-          </a:p>
-          <a:p>
-            <a:pPr marL="0" indent="0">
-              <a:buNone/>
-            </a:pPr>
-            <a:r>
-              <a:rPr lang="en-US" sz="1400" dirty="0">
-                <a:latin typeface="Courier New" pitchFamily="49" charset="0"/>
-                <a:cs typeface="Courier New" pitchFamily="49" charset="0"/>
-              </a:rPr>
-              <a:t>    // else list size is &gt; 1, so split the list into two </a:t>
-            </a:r>
-            <a:r>
-              <a:rPr lang="en-US" sz="1400" dirty="0" err="1">
-                <a:latin typeface="Courier New" pitchFamily="49" charset="0"/>
-                <a:cs typeface="Courier New" pitchFamily="49" charset="0"/>
-              </a:rPr>
-              <a:t>sublists</a:t>
-            </a:r>
-            <a:endParaRPr lang="en-US" sz="1400" dirty="0">
-              <a:latin typeface="Courier New" pitchFamily="49" charset="0"/>
-              <a:cs typeface="Courier New" pitchFamily="49" charset="0"/>
-            </a:endParaRPr>
-          </a:p>
-          <a:p>
-            <a:pPr marL="0" indent="0">
-              <a:buNone/>
-            </a:pPr>
-            <a:r>
-              <a:rPr lang="en-US" sz="1400" dirty="0">
-                <a:latin typeface="Courier New" pitchFamily="49" charset="0"/>
-                <a:cs typeface="Courier New" pitchFamily="49" charset="0"/>
-              </a:rPr>
-              <a:t>    </a:t>
-            </a:r>
-            <a:r>
-              <a:rPr lang="en-US" sz="1400" dirty="0" err="1">
-                <a:latin typeface="Courier New" pitchFamily="49" charset="0"/>
-                <a:cs typeface="Courier New" pitchFamily="49" charset="0"/>
-              </a:rPr>
-              <a:t>var</a:t>
-            </a:r>
-            <a:r>
-              <a:rPr lang="en-US" sz="1400" dirty="0">
-                <a:latin typeface="Courier New" pitchFamily="49" charset="0"/>
-                <a:cs typeface="Courier New" pitchFamily="49" charset="0"/>
-              </a:rPr>
-              <a:t> list left, right</a:t>
-            </a:r>
-          </a:p>
-          <a:p>
-            <a:pPr marL="0" indent="0">
-              <a:buNone/>
-            </a:pPr>
-            <a:r>
-              <a:rPr lang="en-US" sz="1400" dirty="0">
-                <a:latin typeface="Courier New" pitchFamily="49" charset="0"/>
-                <a:cs typeface="Courier New" pitchFamily="49" charset="0"/>
-              </a:rPr>
-              <a:t>    </a:t>
-            </a:r>
-            <a:r>
-              <a:rPr lang="en-US" sz="1400" dirty="0" err="1">
-                <a:latin typeface="Courier New" pitchFamily="49" charset="0"/>
-                <a:cs typeface="Courier New" pitchFamily="49" charset="0"/>
-              </a:rPr>
-              <a:t>var</a:t>
-            </a:r>
-            <a:r>
-              <a:rPr lang="en-US" sz="1400" dirty="0">
-                <a:latin typeface="Courier New" pitchFamily="49" charset="0"/>
-                <a:cs typeface="Courier New" pitchFamily="49" charset="0"/>
-              </a:rPr>
-              <a:t> integer middle = length(m) / 2</a:t>
-            </a:r>
-          </a:p>
-          <a:p>
-            <a:pPr marL="0" indent="0">
-              <a:buNone/>
-            </a:pPr>
-            <a:r>
-              <a:rPr lang="en-US" sz="1400" dirty="0">
-                <a:latin typeface="Courier New" pitchFamily="49" charset="0"/>
-                <a:cs typeface="Courier New" pitchFamily="49" charset="0"/>
-              </a:rPr>
-              <a:t>    for each x in m before middle</a:t>
-            </a:r>
-          </a:p>
-          <a:p>
-            <a:pPr marL="0" indent="0">
-              <a:buNone/>
-            </a:pPr>
-            <a:r>
-              <a:rPr lang="en-US" sz="1400" dirty="0">
-                <a:latin typeface="Courier New" pitchFamily="49" charset="0"/>
-                <a:cs typeface="Courier New" pitchFamily="49" charset="0"/>
-              </a:rPr>
-              <a:t>         add x to left</a:t>
-            </a:r>
-          </a:p>
-          <a:p>
-            <a:pPr marL="0" indent="0">
-              <a:buNone/>
-            </a:pPr>
-            <a:r>
-              <a:rPr lang="en-US" sz="1400" dirty="0">
-                <a:latin typeface="Courier New" pitchFamily="49" charset="0"/>
-                <a:cs typeface="Courier New" pitchFamily="49" charset="0"/>
-              </a:rPr>
-              <a:t>    for each x in m after or equal middle</a:t>
-            </a:r>
-          </a:p>
-          <a:p>
-            <a:pPr marL="0" indent="0">
-              <a:buNone/>
-            </a:pPr>
-            <a:r>
-              <a:rPr lang="en-US" sz="1400" dirty="0">
-                <a:latin typeface="Courier New" pitchFamily="49" charset="0"/>
-                <a:cs typeface="Courier New" pitchFamily="49" charset="0"/>
-              </a:rPr>
-              <a:t>         add x to </a:t>
-            </a:r>
-            <a:r>
-              <a:rPr lang="en-US" sz="1400" dirty="0" smtClean="0">
-                <a:latin typeface="Courier New" pitchFamily="49" charset="0"/>
-                <a:cs typeface="Courier New" pitchFamily="49" charset="0"/>
-              </a:rPr>
-              <a:t>right</a:t>
-            </a:r>
-          </a:p>
-          <a:p>
-            <a:pPr marL="0" indent="0">
-              <a:buNone/>
-            </a:pPr>
-            <a:endParaRPr lang="en-US" sz="1400" dirty="0">
-              <a:latin typeface="Courier New" pitchFamily="49" charset="0"/>
-              <a:cs typeface="Courier New" pitchFamily="49" charset="0"/>
-            </a:endParaRPr>
-          </a:p>
-          <a:p>
-            <a:pPr marL="0" indent="0">
-              <a:buNone/>
-            </a:pPr>
-            <a:r>
-              <a:rPr lang="en-US" sz="1400" dirty="0">
-                <a:latin typeface="Courier New" pitchFamily="49" charset="0"/>
-                <a:cs typeface="Courier New" pitchFamily="49" charset="0"/>
-              </a:rPr>
-              <a:t>    // recursively call </a:t>
-            </a:r>
-            <a:r>
-              <a:rPr lang="en-US" sz="1400" dirty="0" err="1">
-                <a:latin typeface="Courier New" pitchFamily="49" charset="0"/>
-                <a:cs typeface="Courier New" pitchFamily="49" charset="0"/>
-              </a:rPr>
-              <a:t>merge_sort</a:t>
-            </a:r>
-            <a:r>
-              <a:rPr lang="en-US" sz="1400" dirty="0">
-                <a:latin typeface="Courier New" pitchFamily="49" charset="0"/>
-                <a:cs typeface="Courier New" pitchFamily="49" charset="0"/>
-              </a:rPr>
-              <a:t>() to further split each </a:t>
-            </a:r>
-            <a:r>
-              <a:rPr lang="en-US" sz="1400" dirty="0" err="1">
-                <a:latin typeface="Courier New" pitchFamily="49" charset="0"/>
-                <a:cs typeface="Courier New" pitchFamily="49" charset="0"/>
-              </a:rPr>
-              <a:t>sublist</a:t>
-            </a:r>
-            <a:endParaRPr lang="en-US" sz="1400" dirty="0">
-              <a:latin typeface="Courier New" pitchFamily="49" charset="0"/>
-              <a:cs typeface="Courier New" pitchFamily="49" charset="0"/>
-            </a:endParaRPr>
-          </a:p>
-          <a:p>
-            <a:pPr marL="0" indent="0">
-              <a:buNone/>
-            </a:pPr>
-            <a:r>
-              <a:rPr lang="en-US" sz="1400" dirty="0">
-                <a:latin typeface="Courier New" pitchFamily="49" charset="0"/>
-                <a:cs typeface="Courier New" pitchFamily="49" charset="0"/>
-              </a:rPr>
-              <a:t>    // until </a:t>
-            </a:r>
-            <a:r>
-              <a:rPr lang="en-US" sz="1400" dirty="0" err="1">
-                <a:latin typeface="Courier New" pitchFamily="49" charset="0"/>
-                <a:cs typeface="Courier New" pitchFamily="49" charset="0"/>
-              </a:rPr>
-              <a:t>sublist</a:t>
-            </a:r>
-            <a:r>
-              <a:rPr lang="en-US" sz="1400" dirty="0">
-                <a:latin typeface="Courier New" pitchFamily="49" charset="0"/>
-                <a:cs typeface="Courier New" pitchFamily="49" charset="0"/>
-              </a:rPr>
-              <a:t> size is 1</a:t>
-            </a:r>
-          </a:p>
-          <a:p>
-            <a:pPr marL="0" indent="0">
-              <a:buNone/>
-            </a:pPr>
-            <a:r>
-              <a:rPr lang="en-US" sz="1400" dirty="0">
-                <a:latin typeface="Courier New" pitchFamily="49" charset="0"/>
-                <a:cs typeface="Courier New" pitchFamily="49" charset="0"/>
-              </a:rPr>
-              <a:t>    left = </a:t>
-            </a:r>
-            <a:r>
-              <a:rPr lang="en-US" sz="1400" b="1" dirty="0" err="1">
-                <a:latin typeface="Courier New" pitchFamily="49" charset="0"/>
-                <a:cs typeface="Courier New" pitchFamily="49" charset="0"/>
-              </a:rPr>
-              <a:t>merge_sort</a:t>
-            </a:r>
-            <a:r>
-              <a:rPr lang="en-US" sz="1400" dirty="0">
-                <a:latin typeface="Courier New" pitchFamily="49" charset="0"/>
-                <a:cs typeface="Courier New" pitchFamily="49" charset="0"/>
-              </a:rPr>
-              <a:t>(left)</a:t>
-            </a:r>
-          </a:p>
-          <a:p>
-            <a:pPr marL="0" indent="0">
-              <a:buNone/>
-            </a:pPr>
-            <a:r>
-              <a:rPr lang="en-US" sz="1400" dirty="0">
-                <a:latin typeface="Courier New" pitchFamily="49" charset="0"/>
-                <a:cs typeface="Courier New" pitchFamily="49" charset="0"/>
-              </a:rPr>
-              <a:t>    right = </a:t>
-            </a:r>
-            <a:r>
-              <a:rPr lang="en-US" sz="1400" b="1" dirty="0" err="1">
-                <a:latin typeface="Courier New" pitchFamily="49" charset="0"/>
-                <a:cs typeface="Courier New" pitchFamily="49" charset="0"/>
-              </a:rPr>
-              <a:t>merge_sort</a:t>
-            </a:r>
-            <a:r>
-              <a:rPr lang="en-US" sz="1400" dirty="0">
-                <a:latin typeface="Courier New" pitchFamily="49" charset="0"/>
-                <a:cs typeface="Courier New" pitchFamily="49" charset="0"/>
-              </a:rPr>
-              <a:t>(right</a:t>
-            </a:r>
-            <a:r>
-              <a:rPr lang="en-US" sz="1400" dirty="0" smtClean="0">
-                <a:latin typeface="Courier New" pitchFamily="49" charset="0"/>
-                <a:cs typeface="Courier New" pitchFamily="49" charset="0"/>
-              </a:rPr>
-              <a:t>)</a:t>
-            </a:r>
-          </a:p>
-          <a:p>
-            <a:pPr marL="0" indent="0">
-              <a:buNone/>
-            </a:pPr>
-            <a:endParaRPr lang="en-US" sz="1400" dirty="0">
-              <a:latin typeface="Courier New" pitchFamily="49" charset="0"/>
-              <a:cs typeface="Courier New" pitchFamily="49" charset="0"/>
-            </a:endParaRPr>
-          </a:p>
-          <a:p>
-            <a:pPr marL="0" indent="0">
-              <a:buNone/>
-            </a:pPr>
-            <a:r>
-              <a:rPr lang="en-US" sz="1400" dirty="0">
-                <a:latin typeface="Courier New" pitchFamily="49" charset="0"/>
-                <a:cs typeface="Courier New" pitchFamily="49" charset="0"/>
-              </a:rPr>
-              <a:t>    // merge the </a:t>
-            </a:r>
-            <a:r>
-              <a:rPr lang="en-US" sz="1400" dirty="0" err="1">
-                <a:latin typeface="Courier New" pitchFamily="49" charset="0"/>
-                <a:cs typeface="Courier New" pitchFamily="49" charset="0"/>
-              </a:rPr>
-              <a:t>sublists</a:t>
-            </a:r>
-            <a:r>
-              <a:rPr lang="en-US" sz="1400" dirty="0">
-                <a:latin typeface="Courier New" pitchFamily="49" charset="0"/>
-                <a:cs typeface="Courier New" pitchFamily="49" charset="0"/>
-              </a:rPr>
-              <a:t> returned from prior calls to </a:t>
-            </a:r>
-            <a:r>
-              <a:rPr lang="en-US" sz="1400" dirty="0" err="1">
-                <a:latin typeface="Courier New" pitchFamily="49" charset="0"/>
-                <a:cs typeface="Courier New" pitchFamily="49" charset="0"/>
-              </a:rPr>
-              <a:t>merge_sort</a:t>
-            </a:r>
-            <a:r>
-              <a:rPr lang="en-US" sz="1400" dirty="0">
-                <a:latin typeface="Courier New" pitchFamily="49" charset="0"/>
-                <a:cs typeface="Courier New" pitchFamily="49" charset="0"/>
-              </a:rPr>
-              <a:t>()</a:t>
-            </a:r>
-          </a:p>
-          <a:p>
-            <a:pPr marL="0" indent="0">
-              <a:buNone/>
-            </a:pPr>
-            <a:r>
-              <a:rPr lang="en-US" sz="1400" dirty="0">
-                <a:latin typeface="Courier New" pitchFamily="49" charset="0"/>
-                <a:cs typeface="Courier New" pitchFamily="49" charset="0"/>
-              </a:rPr>
-              <a:t>    // and return the resulting merged </a:t>
-            </a:r>
-            <a:r>
-              <a:rPr lang="en-US" sz="1400" dirty="0" err="1">
-                <a:latin typeface="Courier New" pitchFamily="49" charset="0"/>
-                <a:cs typeface="Courier New" pitchFamily="49" charset="0"/>
-              </a:rPr>
-              <a:t>sublist</a:t>
-            </a:r>
-            <a:endParaRPr lang="en-US" sz="1400" dirty="0">
-              <a:latin typeface="Courier New" pitchFamily="49" charset="0"/>
-              <a:cs typeface="Courier New" pitchFamily="49" charset="0"/>
-            </a:endParaRPr>
-          </a:p>
-          <a:p>
-            <a:pPr marL="0" indent="0">
-              <a:buNone/>
-            </a:pPr>
-            <a:r>
-              <a:rPr lang="en-US" sz="1400" dirty="0">
-                <a:latin typeface="Courier New" pitchFamily="49" charset="0"/>
-                <a:cs typeface="Courier New" pitchFamily="49" charset="0"/>
-              </a:rPr>
-              <a:t>    return </a:t>
-            </a:r>
-            <a:r>
-              <a:rPr lang="en-US" sz="1400" b="1" dirty="0" smtClean="0">
-                <a:latin typeface="Courier New" pitchFamily="49" charset="0"/>
-                <a:cs typeface="Courier New" pitchFamily="49" charset="0"/>
-              </a:rPr>
-              <a:t>merge</a:t>
-            </a:r>
-            <a:r>
-              <a:rPr lang="en-US" sz="1400" dirty="0" smtClean="0">
-                <a:latin typeface="Courier New" pitchFamily="49" charset="0"/>
-                <a:cs typeface="Courier New" pitchFamily="49" charset="0"/>
-              </a:rPr>
-              <a:t> (</a:t>
-            </a:r>
-            <a:r>
-              <a:rPr lang="en-US" sz="1400" dirty="0">
-                <a:latin typeface="Courier New" pitchFamily="49" charset="0"/>
-                <a:cs typeface="Courier New" pitchFamily="49" charset="0"/>
-              </a:rPr>
-              <a:t>left, right)</a:t>
-            </a:r>
-            <a:endParaRPr lang="da-DK" sz="1400" dirty="0">
-              <a:latin typeface="Courier New" pitchFamily="49" charset="0"/>
-              <a:cs typeface="Courier New" pitchFamily="49" charset="0"/>
-            </a:endParaRPr>
-          </a:p>
-        </p:txBody>
-      </p:sp>
+      </p:pic>
       <p:sp>
         <p:nvSpPr>
           <p:cNvPr id="4" name="Date Placeholder 3"/>
@@ -6363,46 +5911,132 @@
               <a:buNone/>
             </a:pPr>
             <a:r>
+              <a:rPr lang="en-US" sz="1400" dirty="0" smtClean="0">
+                <a:latin typeface="Courier New" pitchFamily="49" charset="0"/>
+                <a:cs typeface="Courier New" pitchFamily="49" charset="0"/>
+              </a:rPr>
+              <a:t>function </a:t>
+            </a:r>
+            <a:r>
+              <a:rPr lang="en-US" sz="1400" b="1" dirty="0" smtClean="0">
+                <a:latin typeface="Courier New" pitchFamily="49" charset="0"/>
+                <a:cs typeface="Courier New" pitchFamily="49" charset="0"/>
+              </a:rPr>
+              <a:t>merge</a:t>
+            </a:r>
+            <a:r>
+              <a:rPr lang="en-US" sz="1400" dirty="0" smtClean="0">
+                <a:latin typeface="Courier New" pitchFamily="49" charset="0"/>
+                <a:cs typeface="Courier New" pitchFamily="49" charset="0"/>
+              </a:rPr>
+              <a:t>(list left, list right)</a:t>
+            </a:r>
+          </a:p>
+          <a:p>
+            <a:pPr marL="0" indent="0">
+              <a:buNone/>
+            </a:pPr>
+            <a:r>
+              <a:rPr lang="en-US" sz="1400" dirty="0" smtClean="0">
+                <a:latin typeface="Courier New" pitchFamily="49" charset="0"/>
+                <a:cs typeface="Courier New" pitchFamily="49" charset="0"/>
+              </a:rPr>
+              <a:t>    </a:t>
+            </a:r>
+            <a:r>
+              <a:rPr lang="en-US" sz="1400" dirty="0" err="1" smtClean="0">
+                <a:latin typeface="Courier New" pitchFamily="49" charset="0"/>
+                <a:cs typeface="Courier New" pitchFamily="49" charset="0"/>
+              </a:rPr>
+              <a:t>var</a:t>
+            </a:r>
+            <a:r>
+              <a:rPr lang="en-US" sz="1400" dirty="0" smtClean="0">
+                <a:latin typeface="Courier New" pitchFamily="49" charset="0"/>
+                <a:cs typeface="Courier New" pitchFamily="49" charset="0"/>
+              </a:rPr>
+              <a:t> list result</a:t>
+            </a:r>
+          </a:p>
+          <a:p>
+            <a:pPr marL="0" indent="0">
+              <a:buNone/>
+            </a:pPr>
+            <a:r>
+              <a:rPr lang="en-US" sz="1400" dirty="0" smtClean="0">
+                <a:latin typeface="Courier New" pitchFamily="49" charset="0"/>
+                <a:cs typeface="Courier New" pitchFamily="49" charset="0"/>
+              </a:rPr>
+              <a:t>    while something left in both</a:t>
+            </a:r>
+          </a:p>
+          <a:p>
+            <a:pPr marL="0" indent="0">
+              <a:buNone/>
+            </a:pPr>
+            <a:r>
+              <a:rPr lang="en-US" sz="1400" dirty="0" smtClean="0">
+                <a:latin typeface="Courier New" pitchFamily="49" charset="0"/>
+                <a:cs typeface="Courier New" pitchFamily="49" charset="0"/>
+              </a:rPr>
+              <a:t>	if first of left &lt; first of right</a:t>
+            </a:r>
+          </a:p>
+          <a:p>
+            <a:pPr marL="0" indent="0">
+              <a:buNone/>
+            </a:pPr>
+            <a:r>
               <a:rPr lang="en-US" sz="1400" dirty="0">
                 <a:latin typeface="Courier New" pitchFamily="49" charset="0"/>
                 <a:cs typeface="Courier New" pitchFamily="49" charset="0"/>
               </a:rPr>
-              <a:t>function </a:t>
-            </a:r>
-            <a:r>
-              <a:rPr lang="en-US" sz="1400" b="1" dirty="0" smtClean="0">
-                <a:latin typeface="Courier New" pitchFamily="49" charset="0"/>
-                <a:cs typeface="Courier New" pitchFamily="49" charset="0"/>
-              </a:rPr>
-              <a:t>merge</a:t>
+              <a:t>	</a:t>
             </a:r>
             <a:r>
               <a:rPr lang="en-US" sz="1400" dirty="0" smtClean="0">
                 <a:latin typeface="Courier New" pitchFamily="49" charset="0"/>
                 <a:cs typeface="Courier New" pitchFamily="49" charset="0"/>
               </a:rPr>
-              <a:t>(list left</a:t>
-            </a:r>
+              <a:t>	insert first of left into result</a:t>
+            </a:r>
+          </a:p>
+          <a:p>
+            <a:pPr marL="0" indent="0">
+              <a:buNone/>
+            </a:pPr>
             <a:r>
               <a:rPr lang="en-US" sz="1400" dirty="0">
                 <a:latin typeface="Courier New" pitchFamily="49" charset="0"/>
                 <a:cs typeface="Courier New" pitchFamily="49" charset="0"/>
               </a:rPr>
-              <a:t>, </a:t>
+              <a:t>	</a:t>
             </a:r>
             <a:r>
               <a:rPr lang="en-US" sz="1400" dirty="0" smtClean="0">
                 <a:latin typeface="Courier New" pitchFamily="49" charset="0"/>
                 <a:cs typeface="Courier New" pitchFamily="49" charset="0"/>
               </a:rPr>
-              <a:t>list right</a:t>
-            </a:r>
+              <a:t>	remove first from left</a:t>
+            </a:r>
+          </a:p>
+          <a:p>
+            <a:pPr marL="0" indent="0">
+              <a:buNone/>
+            </a:pPr>
             <a:r>
               <a:rPr lang="en-US" sz="1400" dirty="0">
                 <a:latin typeface="Courier New" pitchFamily="49" charset="0"/>
                 <a:cs typeface="Courier New" pitchFamily="49" charset="0"/>
               </a:rPr>
-              <a:t>)</a:t>
+              <a:t>	</a:t>
+            </a:r>
+            <a:r>
+              <a:rPr lang="en-US" sz="1400" dirty="0" smtClean="0">
+                <a:latin typeface="Courier New" pitchFamily="49" charset="0"/>
+                <a:cs typeface="Courier New" pitchFamily="49" charset="0"/>
+              </a:rPr>
+              <a:t>else</a:t>
             </a:r>
           </a:p>
           <a:p>
@@ -6414,21 +6048,33 @@
                 <a:latin typeface="Courier New" pitchFamily="49" charset="0"/>
                 <a:cs typeface="Courier New" pitchFamily="49" charset="0"/>
               </a:rPr>
-              <a:t>    </a:t>
-            </a:r>
-            <a:r>
-              <a:rPr lang="en-US" sz="1400" dirty="0" err="1">
-                <a:latin typeface="Courier New" pitchFamily="49" charset="0"/>
-                <a:cs typeface="Courier New" pitchFamily="49" charset="0"/>
-              </a:rPr>
-              <a:t>var</a:t>
-            </a:r>
+              <a:t>		</a:t>
+            </a:r>
+            <a:r>
+              <a:rPr lang="en-US" sz="1400" dirty="0" smtClean="0">
+                <a:latin typeface="Courier New" pitchFamily="49" charset="0"/>
+                <a:cs typeface="Courier New" pitchFamily="49" charset="0"/>
+              </a:rPr>
+              <a:t>insert first of right into result</a:t>
+            </a:r>
+          </a:p>
+          <a:p>
+            <a:pPr marL="0" indent="0">
+              <a:buNone/>
+            </a:pPr>
             <a:r>
               <a:rPr lang="en-US" sz="1400" dirty="0">
                 <a:latin typeface="Courier New" pitchFamily="49" charset="0"/>
                 <a:cs typeface="Courier New" pitchFamily="49" charset="0"/>
               </a:rPr>
-              <a:t> list result</a:t>
+              <a:t>	</a:t>
+            </a:r>
+            <a:r>
+              <a:rPr lang="en-US" sz="1400" dirty="0" smtClean="0">
+                <a:latin typeface="Courier New" pitchFamily="49" charset="0"/>
+                <a:cs typeface="Courier New" pitchFamily="49" charset="0"/>
+              </a:rPr>
+              <a:t>	remove first from right</a:t>
             </a:r>
           </a:p>
           <a:p>
@@ -6440,183 +6086,75 @@
                 <a:latin typeface="Courier New" pitchFamily="49" charset="0"/>
                 <a:cs typeface="Courier New" pitchFamily="49" charset="0"/>
               </a:rPr>
-              <a:t>    while length(left) &gt; 0 or length(right) &gt; 0</a:t>
-            </a:r>
+              <a:t>	</a:t>
+            </a:r>
+            <a:r>
+              <a:rPr lang="en-US" sz="1400" dirty="0" smtClean="0">
+                <a:latin typeface="Courier New" pitchFamily="49" charset="0"/>
+                <a:cs typeface="Courier New" pitchFamily="49" charset="0"/>
+              </a:rPr>
+              <a:t>end if</a:t>
+            </a:r>
+            <a:r>
+              <a:rPr lang="en-US" sz="1400" dirty="0">
+                <a:latin typeface="Courier New" pitchFamily="49" charset="0"/>
+                <a:cs typeface="Courier New" pitchFamily="49" charset="0"/>
+              </a:rPr>
+              <a:t>	</a:t>
+            </a:r>
+            <a:endParaRPr lang="en-US" sz="1400" dirty="0" smtClean="0">
+              <a:latin typeface="Courier New" pitchFamily="49" charset="0"/>
+              <a:cs typeface="Courier New" pitchFamily="49" charset="0"/>
+            </a:endParaRPr>
           </a:p>
           <a:p>
             <a:pPr marL="0" indent="0">
               <a:buNone/>
             </a:pPr>
             <a:r>
+              <a:rPr lang="en-US" sz="1400" dirty="0" smtClean="0">
+                <a:latin typeface="Courier New" pitchFamily="49" charset="0"/>
+                <a:cs typeface="Courier New" pitchFamily="49" charset="0"/>
+              </a:rPr>
+              <a:t>    end while</a:t>
+            </a:r>
+          </a:p>
+          <a:p>
+            <a:pPr marL="0" indent="0">
+              <a:buNone/>
+            </a:pPr>
+            <a:r>
               <a:rPr lang="en-US" sz="1400" dirty="0">
                 <a:latin typeface="Courier New" pitchFamily="49" charset="0"/>
                 <a:cs typeface="Courier New" pitchFamily="49" charset="0"/>
               </a:rPr>
-              <a:t>        if length(left) &gt; 0 and length(right) &gt; 0</a:t>
-            </a:r>
+              <a:t> </a:t>
+            </a:r>
+            <a:r>
+              <a:rPr lang="en-US" sz="1400" dirty="0" smtClean="0">
+                <a:latin typeface="Courier New" pitchFamily="49" charset="0"/>
+                <a:cs typeface="Courier New" pitchFamily="49" charset="0"/>
+              </a:rPr>
+              <a:t>   insert the remaining elements from left </a:t>
+            </a:r>
+            <a:r>
+              <a:rPr lang="en-US" sz="1400" smtClean="0">
+                <a:latin typeface="Courier New" pitchFamily="49" charset="0"/>
+                <a:cs typeface="Courier New" pitchFamily="49" charset="0"/>
+              </a:rPr>
+              <a:t>or right into result</a:t>
+            </a:r>
+            <a:endParaRPr lang="en-US" sz="1400" dirty="0" smtClean="0">
+              <a:latin typeface="Courier New" pitchFamily="49" charset="0"/>
+              <a:cs typeface="Courier New" pitchFamily="49" charset="0"/>
+            </a:endParaRPr>
           </a:p>
           <a:p>
             <a:pPr marL="0" indent="0">
               <a:buNone/>
             </a:pPr>
             <a:r>
-              <a:rPr lang="en-US" sz="1400" dirty="0">
-                <a:latin typeface="Courier New" pitchFamily="49" charset="0"/>
-                <a:cs typeface="Courier New" pitchFamily="49" charset="0"/>
-              </a:rPr>
-              <a:t>            if first(left) &lt;= first(right)</a:t>
-            </a:r>
-          </a:p>
-          <a:p>
-            <a:pPr marL="0" indent="0">
-              <a:buNone/>
-            </a:pPr>
-            <a:r>
-              <a:rPr lang="en-US" sz="1400" dirty="0">
-                <a:latin typeface="Courier New" pitchFamily="49" charset="0"/>
-                <a:cs typeface="Courier New" pitchFamily="49" charset="0"/>
-              </a:rPr>
-              <a:t>                append first(left) to result</a:t>
-            </a:r>
-          </a:p>
-          <a:p>
-            <a:pPr marL="0" indent="0">
-              <a:buNone/>
-            </a:pPr>
-            <a:r>
-              <a:rPr lang="en-US" sz="1400" dirty="0">
-                <a:latin typeface="Courier New" pitchFamily="49" charset="0"/>
-                <a:cs typeface="Courier New" pitchFamily="49" charset="0"/>
-              </a:rPr>
-              <a:t>                left = rest(left)</a:t>
-            </a:r>
-          </a:p>
-          <a:p>
-            <a:pPr marL="0" indent="0">
-              <a:buNone/>
-            </a:pPr>
-            <a:r>
-              <a:rPr lang="en-US" sz="1400" dirty="0">
-                <a:latin typeface="Courier New" pitchFamily="49" charset="0"/>
-                <a:cs typeface="Courier New" pitchFamily="49" charset="0"/>
-              </a:rPr>
-              <a:t>            else</a:t>
-            </a:r>
-          </a:p>
-          <a:p>
-            <a:pPr marL="0" indent="0">
-              <a:buNone/>
-            </a:pPr>
-            <a:r>
-              <a:rPr lang="en-US" sz="1400" dirty="0">
-                <a:latin typeface="Courier New" pitchFamily="49" charset="0"/>
-                <a:cs typeface="Courier New" pitchFamily="49" charset="0"/>
-              </a:rPr>
-              <a:t>                append first(right) to result</a:t>
-            </a:r>
-          </a:p>
-          <a:p>
-            <a:pPr marL="0" indent="0">
-              <a:buNone/>
-            </a:pPr>
-            <a:r>
-              <a:rPr lang="en-US" sz="1400" dirty="0">
-                <a:latin typeface="Courier New" pitchFamily="49" charset="0"/>
-                <a:cs typeface="Courier New" pitchFamily="49" charset="0"/>
-              </a:rPr>
-              <a:t>                right = rest(right)</a:t>
-            </a:r>
-          </a:p>
-          <a:p>
-            <a:pPr marL="0" indent="0">
-              <a:buNone/>
-            </a:pPr>
-            <a:r>
-              <a:rPr lang="en-US" sz="1400" dirty="0">
-                <a:latin typeface="Courier New" pitchFamily="49" charset="0"/>
-                <a:cs typeface="Courier New" pitchFamily="49" charset="0"/>
-              </a:rPr>
-              <a:t>        else if length(left) &gt; 0</a:t>
-            </a:r>
-          </a:p>
-          <a:p>
-            <a:pPr marL="0" indent="0">
-              <a:buNone/>
-            </a:pPr>
-            <a:r>
-              <a:rPr lang="en-US" sz="1400" dirty="0">
-                <a:latin typeface="Courier New" pitchFamily="49" charset="0"/>
-                <a:cs typeface="Courier New" pitchFamily="49" charset="0"/>
-              </a:rPr>
-              <a:t>            append first(left) to result</a:t>
-            </a:r>
-          </a:p>
-          <a:p>
-            <a:pPr marL="0" indent="0">
-              <a:buNone/>
-            </a:pPr>
-            <a:r>
-              <a:rPr lang="en-US" sz="1400" dirty="0">
-                <a:latin typeface="Courier New" pitchFamily="49" charset="0"/>
-                <a:cs typeface="Courier New" pitchFamily="49" charset="0"/>
-              </a:rPr>
-              <a:t>            left = rest(left)</a:t>
-            </a:r>
-          </a:p>
-          <a:p>
-            <a:pPr marL="0" indent="0">
-              <a:buNone/>
-            </a:pPr>
-            <a:r>
-              <a:rPr lang="en-US" sz="1400" dirty="0">
-                <a:latin typeface="Courier New" pitchFamily="49" charset="0"/>
-                <a:cs typeface="Courier New" pitchFamily="49" charset="0"/>
-              </a:rPr>
-              <a:t>        else if length(right) &gt; 0</a:t>
-            </a:r>
-          </a:p>
-          <a:p>
-            <a:pPr marL="0" indent="0">
-              <a:buNone/>
-            </a:pPr>
-            <a:r>
-              <a:rPr lang="en-US" sz="1400" dirty="0">
-                <a:latin typeface="Courier New" pitchFamily="49" charset="0"/>
-                <a:cs typeface="Courier New" pitchFamily="49" charset="0"/>
-              </a:rPr>
-              <a:t>            append first(right) to result</a:t>
-            </a:r>
-          </a:p>
-          <a:p>
-            <a:pPr marL="0" indent="0">
-              <a:buNone/>
-            </a:pPr>
-            <a:r>
-              <a:rPr lang="en-US" sz="1400" dirty="0">
-                <a:latin typeface="Courier New" pitchFamily="49" charset="0"/>
-                <a:cs typeface="Courier New" pitchFamily="49" charset="0"/>
-              </a:rPr>
-              <a:t>            right = rest(right)</a:t>
-            </a:r>
-          </a:p>
-          <a:p>
-            <a:pPr marL="0" indent="0">
-              <a:buNone/>
-            </a:pPr>
-            <a:r>
-              <a:rPr lang="en-US" sz="1400" dirty="0">
-                <a:latin typeface="Courier New" pitchFamily="49" charset="0"/>
-                <a:cs typeface="Courier New" pitchFamily="49" charset="0"/>
-              </a:rPr>
-              <a:t>    end while</a:t>
-            </a:r>
-          </a:p>
-          <a:p>
-            <a:pPr marL="0" indent="0">
-              <a:buNone/>
-            </a:pPr>
-            <a:r>
-              <a:rPr lang="en-US" sz="1400" dirty="0">
+              <a:rPr lang="en-US" sz="1400" dirty="0" smtClean="0">
                 <a:latin typeface="Courier New" pitchFamily="49" charset="0"/>
                 <a:cs typeface="Courier New" pitchFamily="49" charset="0"/>
               </a:rPr>

</xml_diff>